<commit_message>
Finalised presentation and added a moodboard
</commit_message>
<xml_diff>
--- a/Presentations/First Presentation.pptx
+++ b/Presentations/First Presentation.pptx
@@ -7,10 +7,15 @@
   <p:sldIdLst>
     <p:sldId id="256" r:id="rId2"/>
     <p:sldId id="257" r:id="rId3"/>
-    <p:sldId id="258" r:id="rId4"/>
-    <p:sldId id="259" r:id="rId5"/>
-    <p:sldId id="260" r:id="rId6"/>
-    <p:sldId id="261" r:id="rId7"/>
+    <p:sldId id="262" r:id="rId4"/>
+    <p:sldId id="265" r:id="rId5"/>
+    <p:sldId id="258" r:id="rId6"/>
+    <p:sldId id="259" r:id="rId7"/>
+    <p:sldId id="260" r:id="rId8"/>
+    <p:sldId id="264" r:id="rId9"/>
+    <p:sldId id="263" r:id="rId10"/>
+    <p:sldId id="261" r:id="rId11"/>
+    <p:sldId id="266" r:id="rId12"/>
   </p:sldIdLst>
   <p:sldSz cx="12192000" cy="6858000"/>
   <p:notesSz cx="6858000" cy="9144000"/>
@@ -109,6 +114,11 @@
       </a:defRPr>
     </a:lvl9pPr>
   </p:defaultTextStyle>
+  <p:extLst>
+    <p:ext uri="{EFAFB233-063F-42B5-8137-9DF3F51BA10A}">
+      <p15:sldGuideLst xmlns:p15="http://schemas.microsoft.com/office/powerpoint/2012/main"/>
+    </p:ext>
+  </p:extLst>
 </p:presentation>
 </file>
 
@@ -301,7 +311,7 @@
             <a:fld id="{B61BEF0D-F0BB-DE4B-95CE-6DB70DBA9567}" type="datetimeFigureOut">
               <a:rPr lang="en-US" dirty="0"/>
               <a:pPr/>
-              <a:t>1/29/2017</a:t>
+              <a:t>1/31/2017</a:t>
             </a:fld>
             <a:endParaRPr lang="en-US" dirty="0"/>
           </a:p>
@@ -636,7 +646,7 @@
             <a:fld id="{B61BEF0D-F0BB-DE4B-95CE-6DB70DBA9567}" type="datetimeFigureOut">
               <a:rPr lang="en-US" dirty="0"/>
               <a:pPr/>
-              <a:t>1/29/2017</a:t>
+              <a:t>1/31/2017</a:t>
             </a:fld>
             <a:endParaRPr lang="en-US" dirty="0"/>
           </a:p>
@@ -1034,7 +1044,7 @@
             <a:fld id="{B61BEF0D-F0BB-DE4B-95CE-6DB70DBA9567}" type="datetimeFigureOut">
               <a:rPr lang="en-US" dirty="0"/>
               <a:pPr/>
-              <a:t>1/29/2017</a:t>
+              <a:t>1/31/2017</a:t>
             </a:fld>
             <a:endParaRPr lang="en-US" dirty="0"/>
           </a:p>
@@ -1367,7 +1377,7 @@
             <a:fld id="{B61BEF0D-F0BB-DE4B-95CE-6DB70DBA9567}" type="datetimeFigureOut">
               <a:rPr lang="en-US" dirty="0"/>
               <a:pPr/>
-              <a:t>1/29/2017</a:t>
+              <a:t>1/31/2017</a:t>
             </a:fld>
             <a:endParaRPr lang="en-US" dirty="0"/>
           </a:p>
@@ -1684,7 +1694,7 @@
             <a:fld id="{B61BEF0D-F0BB-DE4B-95CE-6DB70DBA9567}" type="datetimeFigureOut">
               <a:rPr lang="en-US" dirty="0"/>
               <a:pPr/>
-              <a:t>1/29/2017</a:t>
+              <a:t>1/31/2017</a:t>
             </a:fld>
             <a:endParaRPr lang="en-US" dirty="0"/>
           </a:p>
@@ -2077,7 +2087,7 @@
             <a:fld id="{B61BEF0D-F0BB-DE4B-95CE-6DB70DBA9567}" type="datetimeFigureOut">
               <a:rPr lang="en-US" dirty="0"/>
               <a:pPr/>
-              <a:t>1/29/2017</a:t>
+              <a:t>1/31/2017</a:t>
             </a:fld>
             <a:endParaRPr lang="en-US" dirty="0"/>
           </a:p>
@@ -2331,7 +2341,7 @@
             <a:fld id="{B61BEF0D-F0BB-DE4B-95CE-6DB70DBA9567}" type="datetimeFigureOut">
               <a:rPr lang="en-US" dirty="0"/>
               <a:pPr/>
-              <a:t>1/29/2017</a:t>
+              <a:t>1/31/2017</a:t>
             </a:fld>
             <a:endParaRPr lang="en-US" dirty="0"/>
           </a:p>
@@ -2590,7 +2600,7 @@
             <a:fld id="{B61BEF0D-F0BB-DE4B-95CE-6DB70DBA9567}" type="datetimeFigureOut">
               <a:rPr lang="en-US" dirty="0"/>
               <a:pPr/>
-              <a:t>1/29/2017</a:t>
+              <a:t>1/31/2017</a:t>
             </a:fld>
             <a:endParaRPr lang="en-US" dirty="0"/>
           </a:p>
@@ -2849,7 +2859,7 @@
             <a:fld id="{B61BEF0D-F0BB-DE4B-95CE-6DB70DBA9567}" type="datetimeFigureOut">
               <a:rPr lang="en-US" dirty="0"/>
               <a:pPr/>
-              <a:t>1/29/2017</a:t>
+              <a:t>1/31/2017</a:t>
             </a:fld>
             <a:endParaRPr lang="en-US" dirty="0"/>
           </a:p>
@@ -3175,7 +3185,7 @@
             <a:fld id="{B61BEF0D-F0BB-DE4B-95CE-6DB70DBA9567}" type="datetimeFigureOut">
               <a:rPr lang="en-US" dirty="0"/>
               <a:pPr/>
-              <a:t>1/29/2017</a:t>
+              <a:t>1/31/2017</a:t>
             </a:fld>
             <a:endParaRPr lang="en-US" dirty="0"/>
           </a:p>
@@ -3495,7 +3505,7 @@
             <a:fld id="{B61BEF0D-F0BB-DE4B-95CE-6DB70DBA9567}" type="datetimeFigureOut">
               <a:rPr lang="en-US" dirty="0"/>
               <a:pPr/>
-              <a:t>1/29/2017</a:t>
+              <a:t>1/31/2017</a:t>
             </a:fld>
             <a:endParaRPr lang="en-US" dirty="0"/>
           </a:p>
@@ -3949,7 +3959,7 @@
             <a:fld id="{B61BEF0D-F0BB-DE4B-95CE-6DB70DBA9567}" type="datetimeFigureOut">
               <a:rPr lang="en-US" dirty="0"/>
               <a:pPr/>
-              <a:t>1/29/2017</a:t>
+              <a:t>1/31/2017</a:t>
             </a:fld>
             <a:endParaRPr lang="en-US" dirty="0"/>
           </a:p>
@@ -4151,7 +4161,7 @@
             <a:fld id="{B61BEF0D-F0BB-DE4B-95CE-6DB70DBA9567}" type="datetimeFigureOut">
               <a:rPr lang="en-US" dirty="0"/>
               <a:pPr/>
-              <a:t>1/29/2017</a:t>
+              <a:t>1/31/2017</a:t>
             </a:fld>
             <a:endParaRPr lang="en-US" dirty="0"/>
           </a:p>
@@ -4325,7 +4335,7 @@
             <a:fld id="{B61BEF0D-F0BB-DE4B-95CE-6DB70DBA9567}" type="datetimeFigureOut">
               <a:rPr lang="en-US" dirty="0"/>
               <a:pPr/>
-              <a:t>1/29/2017</a:t>
+              <a:t>1/31/2017</a:t>
             </a:fld>
             <a:endParaRPr lang="en-US" dirty="0"/>
           </a:p>
@@ -4655,7 +4665,7 @@
             <a:fld id="{B61BEF0D-F0BB-DE4B-95CE-6DB70DBA9567}" type="datetimeFigureOut">
               <a:rPr lang="en-US" dirty="0"/>
               <a:pPr/>
-              <a:t>1/29/2017</a:t>
+              <a:t>1/31/2017</a:t>
             </a:fld>
             <a:endParaRPr lang="en-US" dirty="0"/>
           </a:p>
@@ -4997,7 +5007,7 @@
             <a:fld id="{B61BEF0D-F0BB-DE4B-95CE-6DB70DBA9567}" type="datetimeFigureOut">
               <a:rPr lang="en-US" dirty="0"/>
               <a:pPr/>
-              <a:t>1/29/2017</a:t>
+              <a:t>1/31/2017</a:t>
             </a:fld>
             <a:endParaRPr lang="en-US" dirty="0"/>
           </a:p>
@@ -7111,7 +7121,7 @@
             <a:fld id="{B61BEF0D-F0BB-DE4B-95CE-6DB70DBA9567}" type="datetimeFigureOut">
               <a:rPr lang="en-US" dirty="0"/>
               <a:pPr/>
-              <a:t>1/29/2017</a:t>
+              <a:t>1/31/2017</a:t>
             </a:fld>
             <a:endParaRPr lang="en-US" dirty="0"/>
           </a:p>
@@ -7703,6 +7713,177 @@
 </p:sld>
 </file>
 
+<file path=ppt/slides/slide10.xml><?xml version="1.0" encoding="utf-8"?>
+<p:sld xmlns:a="http://schemas.openxmlformats.org/drawingml/2006/main" xmlns:r="http://schemas.openxmlformats.org/officeDocument/2006/relationships" xmlns:p="http://schemas.openxmlformats.org/presentationml/2006/main">
+  <p:cSld>
+    <p:spTree>
+      <p:nvGrpSpPr>
+        <p:cNvPr id="1" name=""/>
+        <p:cNvGrpSpPr/>
+        <p:nvPr/>
+      </p:nvGrpSpPr>
+      <p:grpSpPr>
+        <a:xfrm>
+          <a:off x="0" y="0"/>
+          <a:ext cx="0" cy="0"/>
+          <a:chOff x="0" y="0"/>
+          <a:chExt cx="0" cy="0"/>
+        </a:xfrm>
+      </p:grpSpPr>
+      <p:sp>
+        <p:nvSpPr>
+          <p:cNvPr id="2" name="Title 1"/>
+          <p:cNvSpPr>
+            <a:spLocks noGrp="1"/>
+          </p:cNvSpPr>
+          <p:nvPr>
+            <p:ph type="title"/>
+          </p:nvPr>
+        </p:nvSpPr>
+        <p:spPr/>
+        <p:txBody>
+          <a:bodyPr/>
+          <a:lstStyle/>
+          <a:p>
+            <a:r>
+              <a:rPr lang="en-GB" dirty="0"/>
+              <a:t>References</a:t>
+            </a:r>
+          </a:p>
+        </p:txBody>
+      </p:sp>
+      <p:sp>
+        <p:nvSpPr>
+          <p:cNvPr id="3" name="Content Placeholder 2"/>
+          <p:cNvSpPr>
+            <a:spLocks noGrp="1"/>
+          </p:cNvSpPr>
+          <p:nvPr>
+            <p:ph idx="1"/>
+          </p:nvPr>
+        </p:nvSpPr>
+        <p:spPr/>
+        <p:txBody>
+          <a:bodyPr/>
+          <a:lstStyle/>
+          <a:p>
+            <a:r>
+              <a:rPr lang="en-GB" dirty="0">
+                <a:hlinkClick r:id="rId2"/>
+              </a:rPr>
+              <a:t>https://aytm.com/blog/research-junction/angry-birds-addiction/</a:t>
+            </a:r>
+            <a:endParaRPr lang="en-GB" dirty="0"/>
+          </a:p>
+          <a:p>
+            <a:r>
+              <a:rPr lang="en-GB" dirty="0">
+                <a:hlinkClick r:id="rId3"/>
+              </a:rPr>
+              <a:t>https://image.slidesharecdn.com/fourkeystofunbchislides100n081109-090812123810-phpapp02/95/four-keys-to-fun-baychi-slides-100n081109-9-728.jpg?cb=1250081364</a:t>
+            </a:r>
+            <a:endParaRPr lang="en-GB" dirty="0"/>
+          </a:p>
+          <a:p>
+            <a:r>
+              <a:rPr lang="en-GB" dirty="0">
+                <a:hlinkClick r:id="rId4"/>
+              </a:rPr>
+              <a:t>http://www.nicolelazzaro.com/the4-keys-to-fun/</a:t>
+            </a:r>
+            <a:endParaRPr lang="en-GB" dirty="0"/>
+          </a:p>
+          <a:p>
+            <a:r>
+              <a:rPr lang="en-GB" dirty="0">
+                <a:hlinkClick r:id="rId5"/>
+              </a:rPr>
+              <a:t>https://www.angrybirds.com/</a:t>
+            </a:r>
+            <a:endParaRPr lang="en-GB" dirty="0"/>
+          </a:p>
+          <a:p>
+            <a:r>
+              <a:rPr lang="en-GB" dirty="0">
+                <a:hlinkClick r:id="rId6"/>
+              </a:rPr>
+              <a:t>http://www.miniclip.com/games/raft-wars/en/</a:t>
+            </a:r>
+            <a:endParaRPr lang="en-GB" dirty="0"/>
+          </a:p>
+          <a:p>
+            <a:endParaRPr lang="en-GB" dirty="0"/>
+          </a:p>
+          <a:p>
+            <a:endParaRPr lang="en-GB" dirty="0"/>
+          </a:p>
+        </p:txBody>
+      </p:sp>
+    </p:spTree>
+    <p:extLst>
+      <p:ext uri="{BB962C8B-B14F-4D97-AF65-F5344CB8AC3E}">
+        <p14:creationId xmlns:p14="http://schemas.microsoft.com/office/powerpoint/2010/main" val="3431760428"/>
+      </p:ext>
+    </p:extLst>
+  </p:cSld>
+  <p:clrMapOvr>
+    <a:masterClrMapping/>
+  </p:clrMapOvr>
+</p:sld>
+</file>
+
+<file path=ppt/slides/slide11.xml><?xml version="1.0" encoding="utf-8"?>
+<p:sld xmlns:a="http://schemas.openxmlformats.org/drawingml/2006/main" xmlns:r="http://schemas.openxmlformats.org/officeDocument/2006/relationships" xmlns:p="http://schemas.openxmlformats.org/presentationml/2006/main">
+  <p:cSld>
+    <p:spTree>
+      <p:nvGrpSpPr>
+        <p:cNvPr id="1" name=""/>
+        <p:cNvGrpSpPr/>
+        <p:nvPr/>
+      </p:nvGrpSpPr>
+      <p:grpSpPr>
+        <a:xfrm>
+          <a:off x="0" y="0"/>
+          <a:ext cx="0" cy="0"/>
+          <a:chOff x="0" y="0"/>
+          <a:chExt cx="0" cy="0"/>
+        </a:xfrm>
+      </p:grpSpPr>
+      <p:sp>
+        <p:nvSpPr>
+          <p:cNvPr id="2" name="Title 1"/>
+          <p:cNvSpPr>
+            <a:spLocks noGrp="1"/>
+          </p:cNvSpPr>
+          <p:nvPr>
+            <p:ph type="title"/>
+          </p:nvPr>
+        </p:nvSpPr>
+        <p:spPr/>
+        <p:txBody>
+          <a:bodyPr/>
+          <a:lstStyle/>
+          <a:p>
+            <a:r>
+              <a:rPr lang="en-GB" dirty="0"/>
+              <a:t>Questions?</a:t>
+            </a:r>
+          </a:p>
+        </p:txBody>
+      </p:sp>
+    </p:spTree>
+    <p:extLst>
+      <p:ext uri="{BB962C8B-B14F-4D97-AF65-F5344CB8AC3E}">
+        <p14:creationId xmlns:p14="http://schemas.microsoft.com/office/powerpoint/2010/main" val="3034522182"/>
+      </p:ext>
+    </p:extLst>
+  </p:cSld>
+  <p:clrMapOvr>
+    <a:masterClrMapping/>
+  </p:clrMapOvr>
+</p:sld>
+</file>
+
 <file path=ppt/slides/slide2.xml><?xml version="1.0" encoding="utf-8"?>
 <p:sld xmlns:a="http://schemas.openxmlformats.org/drawingml/2006/main" xmlns:r="http://schemas.openxmlformats.org/officeDocument/2006/relationships" xmlns:p="http://schemas.openxmlformats.org/presentationml/2006/main">
   <p:cSld>
@@ -7757,7 +7938,40 @@
           <a:bodyPr/>
           <a:lstStyle/>
           <a:p>
+            <a:r>
+              <a:rPr lang="en-GB" dirty="0"/>
+              <a:t>Help banish diseases from infecting a body or nullify the medicines effects by overpowering them.</a:t>
+            </a:r>
+          </a:p>
+          <a:p>
+            <a:pPr marL="0" indent="0">
+              <a:buNone/>
+            </a:pPr>
             <a:endParaRPr lang="en-GB" dirty="0"/>
+          </a:p>
+          <a:p>
+            <a:r>
+              <a:rPr lang="en-GB" dirty="0"/>
+              <a:t>2 Player</a:t>
+            </a:r>
+          </a:p>
+          <a:p>
+            <a:r>
+              <a:rPr lang="en-GB" dirty="0"/>
+              <a:t>Platform – PC</a:t>
+            </a:r>
+          </a:p>
+          <a:p>
+            <a:r>
+              <a:rPr lang="en-GB" dirty="0"/>
+              <a:t>Genre – Turn based puzzle strategy</a:t>
+            </a:r>
+          </a:p>
+          <a:p>
+            <a:r>
+              <a:rPr lang="en-GB" dirty="0"/>
+              <a:t>Target Audience - Everyone</a:t>
+            </a:r>
           </a:p>
         </p:txBody>
       </p:sp>
@@ -7808,7 +8022,7 @@
           <a:p>
             <a:r>
               <a:rPr lang="en-GB" dirty="0"/>
-              <a:t>Art style</a:t>
+              <a:t>What does the player do?</a:t>
             </a:r>
           </a:p>
         </p:txBody>
@@ -7828,14 +8042,38 @@
           <a:bodyPr/>
           <a:lstStyle/>
           <a:p>
-            <a:endParaRPr lang="en-GB"/>
+            <a:r>
+              <a:rPr lang="en-GB" dirty="0"/>
+              <a:t>Players will fire projectiles towards the enemy lines.</a:t>
+            </a:r>
+          </a:p>
+          <a:p>
+            <a:r>
+              <a:rPr lang="en-GB" dirty="0"/>
+              <a:t>The launcher is effected by how much the mouse is held down and dragged.</a:t>
+            </a:r>
+          </a:p>
+          <a:p>
+            <a:r>
+              <a:rPr lang="en-GB" dirty="0"/>
+              <a:t>Different types of projectiles can be used to allow different scenarios each play.</a:t>
+            </a:r>
+          </a:p>
+          <a:p>
+            <a:r>
+              <a:rPr lang="en-GB" dirty="0"/>
+              <a:t>The goal is to knock the enemy characters into the death zone before they knock yours into it</a:t>
+            </a:r>
+          </a:p>
+          <a:p>
+            <a:endParaRPr lang="en-GB" dirty="0"/>
           </a:p>
         </p:txBody>
       </p:sp>
     </p:spTree>
     <p:extLst>
       <p:ext uri="{BB962C8B-B14F-4D97-AF65-F5344CB8AC3E}">
-        <p14:creationId xmlns:p14="http://schemas.microsoft.com/office/powerpoint/2010/main" val="1698589394"/>
+        <p14:creationId xmlns:p14="http://schemas.microsoft.com/office/powerpoint/2010/main" val="3598993600"/>
       </p:ext>
     </p:extLst>
   </p:cSld>
@@ -7879,60 +8117,42 @@
           <a:p>
             <a:r>
               <a:rPr lang="en-GB" dirty="0"/>
-              <a:t>First mechanic:</a:t>
-            </a:r>
-            <a:br>
+              <a:t>4 keys of fun</a:t>
+            </a:r>
+          </a:p>
+        </p:txBody>
+      </p:sp>
+      <p:sp>
+        <p:nvSpPr>
+          <p:cNvPr id="3" name="Content Placeholder 2"/>
+          <p:cNvSpPr>
+            <a:spLocks noGrp="1"/>
+          </p:cNvSpPr>
+          <p:nvPr>
+            <p:ph idx="1"/>
+          </p:nvPr>
+        </p:nvSpPr>
+        <p:spPr/>
+        <p:txBody>
+          <a:bodyPr/>
+          <a:lstStyle/>
+          <a:p>
+            <a:r>
               <a:rPr lang="en-GB" dirty="0"/>
-            </a:br>
+              <a:t>Different iterations of the game mechanics will focus on a certain key of fun element.</a:t>
+            </a:r>
+          </a:p>
+          <a:p>
             <a:r>
               <a:rPr lang="en-GB" dirty="0"/>
-              <a:t>Shooting/Launch</a:t>
-            </a:r>
-          </a:p>
-        </p:txBody>
-      </p:sp>
-      <p:sp>
-        <p:nvSpPr>
-          <p:cNvPr id="3" name="Content Placeholder 2"/>
-          <p:cNvSpPr>
-            <a:spLocks noGrp="1"/>
-          </p:cNvSpPr>
-          <p:nvPr>
-            <p:ph idx="1"/>
-          </p:nvPr>
-        </p:nvSpPr>
-        <p:spPr>
-          <a:xfrm>
-            <a:off x="3858768" y="2133600"/>
-            <a:ext cx="7645844" cy="3777622"/>
-          </a:xfrm>
-        </p:spPr>
-        <p:txBody>
-          <a:bodyPr/>
-          <a:lstStyle/>
-          <a:p>
-            <a:r>
-              <a:rPr lang="en-GB" dirty="0"/>
-              <a:t>Bowman 2 – Shows the player the degrees/angle of where the player will shoot</a:t>
-            </a:r>
-          </a:p>
-          <a:p>
-            <a:r>
-              <a:rPr lang="en-GB" dirty="0"/>
-              <a:t>Only shows the player. </a:t>
-            </a:r>
-          </a:p>
-          <a:p>
-            <a:r>
-              <a:rPr lang="en-GB" dirty="0"/>
-              <a:t>Camera follows the arrow</a:t>
-            </a:r>
-          </a:p>
-          <a:p>
-            <a:r>
-              <a:rPr lang="en-GB" dirty="0"/>
-              <a:t>Takes time to master as remembering where to shoot can be a challenge.</a:t>
-            </a:r>
+              <a:t>Feedback from playtesting will be a necessity to focus on this.</a:t>
+            </a:r>
+          </a:p>
+          <a:p>
+            <a:endParaRPr lang="en-GB" dirty="0"/>
+          </a:p>
+          <a:p>
+            <a:endParaRPr lang="en-GB" dirty="0"/>
           </a:p>
         </p:txBody>
       </p:sp>
@@ -7951,7 +8171,7 @@
         </p:blipFill>
         <p:spPr>
           <a:xfrm>
-            <a:off x="704088" y="2133600"/>
+            <a:off x="9029588" y="3232441"/>
             <a:ext cx="2929648" cy="2193753"/>
           </a:xfrm>
           <a:prstGeom prst="rect">
@@ -7959,10 +8179,174 @@
           </a:prstGeom>
         </p:spPr>
       </p:pic>
+      <p:sp>
+        <p:nvSpPr>
+          <p:cNvPr id="5" name="TextBox 4"/>
+          <p:cNvSpPr txBox="1"/>
+          <p:nvPr/>
+        </p:nvSpPr>
+        <p:spPr>
+          <a:xfrm>
+            <a:off x="8838349" y="5496616"/>
+            <a:ext cx="3312125" cy="523220"/>
+          </a:xfrm>
+          <a:prstGeom prst="rect">
+            <a:avLst/>
+          </a:prstGeom>
+          <a:noFill/>
+        </p:spPr>
+        <p:txBody>
+          <a:bodyPr wrap="none" rtlCol="0">
+            <a:spAutoFit/>
+          </a:bodyPr>
+          <a:lstStyle/>
+          <a:p>
+            <a:r>
+              <a:rPr lang="en-GB" sz="1400" dirty="0">
+                <a:solidFill>
+                  <a:srgbClr val="00B050"/>
+                </a:solidFill>
+              </a:rPr>
+              <a:t>Hard fun – Shots have to be precise.</a:t>
+            </a:r>
+          </a:p>
+          <a:p>
+            <a:r>
+              <a:rPr lang="en-GB" sz="1400" dirty="0">
+                <a:solidFill>
+                  <a:srgbClr val="00B050"/>
+                </a:solidFill>
+              </a:rPr>
+              <a:t>Hard to master.</a:t>
+            </a:r>
+          </a:p>
+        </p:txBody>
+      </p:sp>
+      <p:pic>
+        <p:nvPicPr>
+          <p:cNvPr id="2050" name="Picture 2" descr="https://i.ytimg.com/vi/0f3x5eVKUwA/maxresdefault.jpg"/>
+          <p:cNvPicPr>
+            <a:picLocks noChangeAspect="1" noChangeArrowheads="1"/>
+          </p:cNvPicPr>
+          <p:nvPr/>
+        </p:nvPicPr>
+        <p:blipFill rotWithShape="1">
+          <a:blip r:embed="rId3">
+            <a:extLst>
+              <a:ext uri="{28A0092B-C50C-407E-A947-70E740481C1C}">
+                <a14:useLocalDpi xmlns:a14="http://schemas.microsoft.com/office/drawing/2010/main" val="0"/>
+              </a:ext>
+            </a:extLst>
+          </a:blip>
+          <a:srcRect r="2593" b="5221"/>
+          <a:stretch/>
+        </p:blipFill>
+        <p:spPr bwMode="auto">
+          <a:xfrm>
+            <a:off x="5125113" y="3280233"/>
+            <a:ext cx="3346022" cy="2145961"/>
+          </a:xfrm>
+          <a:prstGeom prst="rect">
+            <a:avLst/>
+          </a:prstGeom>
+          <a:noFill/>
+          <a:extLst>
+            <a:ext uri="{909E8E84-426E-40DD-AFC4-6F175D3DCCD1}">
+              <a14:hiddenFill xmlns:a14="http://schemas.microsoft.com/office/drawing/2010/main">
+                <a:solidFill>
+                  <a:srgbClr val="FFFFFF"/>
+                </a:solidFill>
+              </a14:hiddenFill>
+            </a:ext>
+          </a:extLst>
+        </p:spPr>
+      </p:pic>
+      <p:sp>
+        <p:nvSpPr>
+          <p:cNvPr id="6" name="TextBox 5"/>
+          <p:cNvSpPr txBox="1"/>
+          <p:nvPr/>
+        </p:nvSpPr>
+        <p:spPr>
+          <a:xfrm>
+            <a:off x="5212080" y="5544408"/>
+            <a:ext cx="3534942" cy="461665"/>
+          </a:xfrm>
+          <a:prstGeom prst="rect">
+            <a:avLst/>
+          </a:prstGeom>
+          <a:noFill/>
+        </p:spPr>
+        <p:txBody>
+          <a:bodyPr wrap="none" rtlCol="0">
+            <a:spAutoFit/>
+          </a:bodyPr>
+          <a:lstStyle/>
+          <a:p>
+            <a:r>
+              <a:rPr lang="en-GB" sz="1200" dirty="0">
+                <a:solidFill>
+                  <a:srgbClr val="00B050"/>
+                </a:solidFill>
+              </a:rPr>
+              <a:t>Easy fun – Shows last shot</a:t>
+            </a:r>
+          </a:p>
+          <a:p>
+            <a:r>
+              <a:rPr lang="en-GB" sz="1200" dirty="0">
+                <a:solidFill>
+                  <a:srgbClr val="00B050"/>
+                </a:solidFill>
+              </a:rPr>
+              <a:t>User friendly and can be mastered at any skill</a:t>
+            </a:r>
+          </a:p>
+        </p:txBody>
+      </p:sp>
+      <p:pic>
+        <p:nvPicPr>
+          <p:cNvPr id="2052" name="Picture 4" descr="https://image.slidesharecdn.com/fourkeystofunbchislides100n081109-090812123810-phpapp02/95/four-keys-to-fun-baychi-slides-100n081109-9-728.jpg?cb=1250081364"/>
+          <p:cNvPicPr>
+            <a:picLocks noChangeAspect="1" noChangeArrowheads="1"/>
+          </p:cNvPicPr>
+          <p:nvPr/>
+        </p:nvPicPr>
+        <p:blipFill rotWithShape="1">
+          <a:blip r:embed="rId4">
+            <a:extLst>
+              <a:ext uri="{28A0092B-C50C-407E-A947-70E740481C1C}">
+                <a14:useLocalDpi xmlns:a14="http://schemas.microsoft.com/office/drawing/2010/main" val="0"/>
+              </a:ext>
+            </a:extLst>
+          </a:blip>
+          <a:srcRect t="8734" b="11636"/>
+          <a:stretch/>
+        </p:blipFill>
+        <p:spPr bwMode="auto">
+          <a:xfrm>
+            <a:off x="617994" y="3280233"/>
+            <a:ext cx="4330382" cy="3022055"/>
+          </a:xfrm>
+          <a:prstGeom prst="rect">
+            <a:avLst/>
+          </a:prstGeom>
+          <a:noFill/>
+          <a:extLst>
+            <a:ext uri="{909E8E84-426E-40DD-AFC4-6F175D3DCCD1}">
+              <a14:hiddenFill xmlns:a14="http://schemas.microsoft.com/office/drawing/2010/main">
+                <a:solidFill>
+                  <a:srgbClr val="FFFFFF"/>
+                </a:solidFill>
+              </a14:hiddenFill>
+            </a:ext>
+          </a:extLst>
+        </p:spPr>
+      </p:pic>
     </p:spTree>
     <p:extLst>
       <p:ext uri="{BB962C8B-B14F-4D97-AF65-F5344CB8AC3E}">
-        <p14:creationId xmlns:p14="http://schemas.microsoft.com/office/powerpoint/2010/main" val="75903784"/>
+        <p14:creationId xmlns:p14="http://schemas.microsoft.com/office/powerpoint/2010/main" val="4288526762"/>
       </p:ext>
     </p:extLst>
   </p:cSld>
@@ -8004,33 +8388,92 @@
           <a:bodyPr/>
           <a:lstStyle/>
           <a:p>
-            <a:endParaRPr lang="en-GB"/>
-          </a:p>
-        </p:txBody>
-      </p:sp>
-      <p:sp>
-        <p:nvSpPr>
-          <p:cNvPr id="3" name="Content Placeholder 2"/>
-          <p:cNvSpPr>
-            <a:spLocks noGrp="1"/>
-          </p:cNvSpPr>
+            <a:r>
+              <a:rPr lang="en-GB" dirty="0"/>
+              <a:t>Art style</a:t>
+            </a:r>
+          </a:p>
+        </p:txBody>
+      </p:sp>
+      <p:pic>
+        <p:nvPicPr>
+          <p:cNvPr id="4" name="Content Placeholder 3"/>
+          <p:cNvPicPr>
+            <a:picLocks noGrp="1" noChangeAspect="1"/>
+          </p:cNvPicPr>
           <p:nvPr>
             <p:ph idx="1"/>
           </p:nvPr>
-        </p:nvSpPr>
-        <p:spPr/>
-        <p:txBody>
-          <a:bodyPr/>
-          <a:lstStyle/>
-          <a:p>
-            <a:endParaRPr lang="en-GB"/>
+        </p:nvPicPr>
+        <p:blipFill>
+          <a:blip r:embed="rId2"/>
+          <a:stretch>
+            <a:fillRect/>
+          </a:stretch>
+        </p:blipFill>
+        <p:spPr>
+          <a:xfrm>
+            <a:off x="703800" y="1787912"/>
+            <a:ext cx="3778250" cy="3778250"/>
+          </a:xfrm>
+        </p:spPr>
+      </p:pic>
+      <p:sp>
+        <p:nvSpPr>
+          <p:cNvPr id="5" name="TextBox 4"/>
+          <p:cNvSpPr txBox="1"/>
+          <p:nvPr/>
+        </p:nvSpPr>
+        <p:spPr>
+          <a:xfrm>
+            <a:off x="4968091" y="1905000"/>
+            <a:ext cx="6886822" cy="1200329"/>
+          </a:xfrm>
+          <a:prstGeom prst="rect">
+            <a:avLst/>
+          </a:prstGeom>
+          <a:noFill/>
+        </p:spPr>
+        <p:txBody>
+          <a:bodyPr wrap="none" rtlCol="0">
+            <a:spAutoFit/>
+          </a:bodyPr>
+          <a:lstStyle/>
+          <a:p>
+            <a:r>
+              <a:rPr lang="en-GB" dirty="0"/>
+              <a:t>Art style of choice:- </a:t>
+            </a:r>
+          </a:p>
+          <a:p>
+            <a:r>
+              <a:rPr lang="en-GB" dirty="0"/>
+              <a:t>Cartoon based drawings.</a:t>
+            </a:r>
+          </a:p>
+          <a:p>
+            <a:pPr marL="285750" indent="-285750">
+              <a:buFontTx/>
+              <a:buChar char="-"/>
+            </a:pPr>
+            <a:r>
+              <a:rPr lang="en-GB" dirty="0"/>
+              <a:t>Easier for the designers to create assets as preferred style.</a:t>
+            </a:r>
+          </a:p>
+          <a:p>
+            <a:pPr marL="285750" indent="-285750">
+              <a:buFontTx/>
+              <a:buChar char="-"/>
+            </a:pPr>
+            <a:endParaRPr lang="en-GB" dirty="0"/>
           </a:p>
         </p:txBody>
       </p:sp>
     </p:spTree>
     <p:extLst>
       <p:ext uri="{BB962C8B-B14F-4D97-AF65-F5344CB8AC3E}">
-        <p14:creationId xmlns:p14="http://schemas.microsoft.com/office/powerpoint/2010/main" val="1382559995"/>
+        <p14:creationId xmlns:p14="http://schemas.microsoft.com/office/powerpoint/2010/main" val="1698589394"/>
       </p:ext>
     </p:extLst>
   </p:cSld>
@@ -8072,7 +8515,17 @@
           <a:bodyPr/>
           <a:lstStyle/>
           <a:p>
-            <a:endParaRPr lang="en-GB"/>
+            <a:r>
+              <a:rPr lang="en-GB" dirty="0"/>
+              <a:t>First mechanic:</a:t>
+            </a:r>
+            <a:br>
+              <a:rPr lang="en-GB" dirty="0"/>
+            </a:br>
+            <a:r>
+              <a:rPr lang="en-GB" dirty="0"/>
+              <a:t>Shooting/Launch</a:t>
+            </a:r>
           </a:p>
         </p:txBody>
       </p:sp>
@@ -8086,19 +8539,566 @@
             <p:ph idx="1"/>
           </p:nvPr>
         </p:nvSpPr>
-        <p:spPr/>
+        <p:spPr>
+          <a:xfrm>
+            <a:off x="3858768" y="2133600"/>
+            <a:ext cx="7645844" cy="3777622"/>
+          </a:xfrm>
+        </p:spPr>
         <p:txBody>
           <a:bodyPr/>
           <a:lstStyle/>
           <a:p>
-            <a:endParaRPr lang="en-GB"/>
+            <a:r>
+              <a:rPr lang="en-GB" dirty="0"/>
+              <a:t>Shows the player the degrees/angle of where the player will shoot</a:t>
+            </a:r>
+          </a:p>
+          <a:p>
+            <a:r>
+              <a:rPr lang="en-GB" dirty="0"/>
+              <a:t>Only shows the player. </a:t>
+            </a:r>
+          </a:p>
+          <a:p>
+            <a:r>
+              <a:rPr lang="en-GB" dirty="0"/>
+              <a:t>Camera follows the arrow</a:t>
+            </a:r>
+          </a:p>
+          <a:p>
+            <a:r>
+              <a:rPr lang="en-GB" dirty="0"/>
+              <a:t>Takes time to master as remembering where to shoot can be a challenge.</a:t>
+            </a:r>
+          </a:p>
+        </p:txBody>
+      </p:sp>
+      <p:pic>
+        <p:nvPicPr>
+          <p:cNvPr id="4" name="Picture 3"/>
+          <p:cNvPicPr>
+            <a:picLocks noChangeAspect="1"/>
+          </p:cNvPicPr>
+          <p:nvPr/>
+        </p:nvPicPr>
+        <p:blipFill rotWithShape="1">
+          <a:blip r:embed="rId2"/>
+          <a:srcRect l="18307" t="30801" r="38152" b="17033"/>
+          <a:stretch/>
+        </p:blipFill>
+        <p:spPr>
+          <a:xfrm>
+            <a:off x="704088" y="2133600"/>
+            <a:ext cx="2929648" cy="2193753"/>
+          </a:xfrm>
+          <a:prstGeom prst="rect">
+            <a:avLst/>
+          </a:prstGeom>
+        </p:spPr>
+      </p:pic>
+      <p:sp>
+        <p:nvSpPr>
+          <p:cNvPr id="5" name="TextBox 4"/>
+          <p:cNvSpPr txBox="1"/>
+          <p:nvPr/>
+        </p:nvSpPr>
+        <p:spPr>
+          <a:xfrm>
+            <a:off x="2980944" y="5285232"/>
+            <a:ext cx="5916168" cy="923330"/>
+          </a:xfrm>
+          <a:prstGeom prst="rect">
+            <a:avLst/>
+          </a:prstGeom>
+          <a:noFill/>
+        </p:spPr>
+        <p:txBody>
+          <a:bodyPr wrap="square" rtlCol="0">
+            <a:spAutoFit/>
+          </a:bodyPr>
+          <a:lstStyle/>
+          <a:p>
+            <a:r>
+              <a:rPr lang="en-GB" dirty="0">
+                <a:hlinkClick r:id="rId3"/>
+              </a:rPr>
+              <a:t>https://www.youtube.com/watch?v=EDxQMLgsJaw&amp;feature=youtu.be</a:t>
+            </a:r>
+            <a:endParaRPr lang="en-GB" dirty="0"/>
+          </a:p>
+          <a:p>
+            <a:endParaRPr lang="en-GB" dirty="0"/>
+          </a:p>
+        </p:txBody>
+      </p:sp>
+      <p:sp>
+        <p:nvSpPr>
+          <p:cNvPr id="6" name="TextBox 5"/>
+          <p:cNvSpPr txBox="1"/>
+          <p:nvPr/>
+        </p:nvSpPr>
+        <p:spPr>
+          <a:xfrm>
+            <a:off x="1316736" y="4327353"/>
+            <a:ext cx="2039112" cy="276999"/>
+          </a:xfrm>
+          <a:prstGeom prst="rect">
+            <a:avLst/>
+          </a:prstGeom>
+          <a:noFill/>
+        </p:spPr>
+        <p:txBody>
+          <a:bodyPr wrap="square" rtlCol="0">
+            <a:spAutoFit/>
+          </a:bodyPr>
+          <a:lstStyle/>
+          <a:p>
+            <a:r>
+              <a:rPr lang="en-GB" sz="1200" dirty="0"/>
+              <a:t>Image from Bowman 2</a:t>
+            </a:r>
           </a:p>
         </p:txBody>
       </p:sp>
     </p:spTree>
     <p:extLst>
       <p:ext uri="{BB962C8B-B14F-4D97-AF65-F5344CB8AC3E}">
-        <p14:creationId xmlns:p14="http://schemas.microsoft.com/office/powerpoint/2010/main" val="3431760428"/>
+        <p14:creationId xmlns:p14="http://schemas.microsoft.com/office/powerpoint/2010/main" val="75903784"/>
+      </p:ext>
+    </p:extLst>
+  </p:cSld>
+  <p:clrMapOvr>
+    <a:masterClrMapping/>
+  </p:clrMapOvr>
+</p:sld>
+</file>
+
+<file path=ppt/slides/slide7.xml><?xml version="1.0" encoding="utf-8"?>
+<p:sld xmlns:a="http://schemas.openxmlformats.org/drawingml/2006/main" xmlns:r="http://schemas.openxmlformats.org/officeDocument/2006/relationships" xmlns:p="http://schemas.openxmlformats.org/presentationml/2006/main">
+  <p:cSld>
+    <p:spTree>
+      <p:nvGrpSpPr>
+        <p:cNvPr id="1" name=""/>
+        <p:cNvGrpSpPr/>
+        <p:nvPr/>
+      </p:nvGrpSpPr>
+      <p:grpSpPr>
+        <a:xfrm>
+          <a:off x="0" y="0"/>
+          <a:ext cx="0" cy="0"/>
+          <a:chOff x="0" y="0"/>
+          <a:chExt cx="0" cy="0"/>
+        </a:xfrm>
+      </p:grpSpPr>
+      <p:sp>
+        <p:nvSpPr>
+          <p:cNvPr id="2" name="Title 1"/>
+          <p:cNvSpPr>
+            <a:spLocks noGrp="1"/>
+          </p:cNvSpPr>
+          <p:nvPr>
+            <p:ph type="title"/>
+          </p:nvPr>
+        </p:nvSpPr>
+        <p:spPr/>
+        <p:txBody>
+          <a:bodyPr/>
+          <a:lstStyle/>
+          <a:p>
+            <a:r>
+              <a:rPr lang="en-GB" dirty="0"/>
+              <a:t>Second mechanic:</a:t>
+            </a:r>
+            <a:br>
+              <a:rPr lang="en-GB" dirty="0"/>
+            </a:br>
+            <a:r>
+              <a:rPr lang="en-GB" dirty="0"/>
+              <a:t>Collision</a:t>
+            </a:r>
+          </a:p>
+        </p:txBody>
+      </p:sp>
+      <p:sp>
+        <p:nvSpPr>
+          <p:cNvPr id="3" name="Content Placeholder 2"/>
+          <p:cNvSpPr>
+            <a:spLocks noGrp="1"/>
+          </p:cNvSpPr>
+          <p:nvPr>
+            <p:ph idx="1"/>
+          </p:nvPr>
+        </p:nvSpPr>
+        <p:spPr/>
+        <p:txBody>
+          <a:bodyPr/>
+          <a:lstStyle/>
+          <a:p>
+            <a:r>
+              <a:rPr lang="en-GB" dirty="0"/>
+              <a:t>Characters/ objects will react to another object colliding with it.</a:t>
+            </a:r>
+          </a:p>
+          <a:p>
+            <a:r>
+              <a:rPr lang="en-GB" dirty="0"/>
+              <a:t>Destroys objects i.e. certain assets</a:t>
+            </a:r>
+          </a:p>
+          <a:p>
+            <a:r>
+              <a:rPr lang="en-GB" dirty="0"/>
+              <a:t>Pushes them with force depending on what was launched.</a:t>
+            </a:r>
+          </a:p>
+          <a:p>
+            <a:endParaRPr lang="en-GB" dirty="0"/>
+          </a:p>
+        </p:txBody>
+      </p:sp>
+      <p:pic>
+        <p:nvPicPr>
+          <p:cNvPr id="1026" name="Picture 2" descr="http://www.raftwars3.net/wp-content/uploads/2012/06/raft-wars-4.jpg"/>
+          <p:cNvPicPr>
+            <a:picLocks noChangeAspect="1" noChangeArrowheads="1"/>
+          </p:cNvPicPr>
+          <p:nvPr/>
+        </p:nvPicPr>
+        <p:blipFill>
+          <a:blip r:embed="rId2">
+            <a:extLst>
+              <a:ext uri="{28A0092B-C50C-407E-A947-70E740481C1C}">
+                <a14:useLocalDpi xmlns:a14="http://schemas.microsoft.com/office/drawing/2010/main" val="0"/>
+              </a:ext>
+            </a:extLst>
+          </a:blip>
+          <a:srcRect/>
+          <a:stretch>
+            <a:fillRect/>
+          </a:stretch>
+        </p:blipFill>
+        <p:spPr bwMode="auto">
+          <a:xfrm>
+            <a:off x="7771858" y="3838884"/>
+            <a:ext cx="3192863" cy="2394647"/>
+          </a:xfrm>
+          <a:prstGeom prst="rect">
+            <a:avLst/>
+          </a:prstGeom>
+          <a:noFill/>
+          <a:extLst>
+            <a:ext uri="{909E8E84-426E-40DD-AFC4-6F175D3DCCD1}">
+              <a14:hiddenFill xmlns:a14="http://schemas.microsoft.com/office/drawing/2010/main">
+                <a:solidFill>
+                  <a:srgbClr val="FFFFFF"/>
+                </a:solidFill>
+              </a14:hiddenFill>
+            </a:ext>
+          </a:extLst>
+        </p:spPr>
+      </p:pic>
+      <p:cxnSp>
+        <p:nvCxnSpPr>
+          <p:cNvPr id="7" name="Straight Arrow Connector 6"/>
+          <p:cNvCxnSpPr/>
+          <p:nvPr/>
+        </p:nvCxnSpPr>
+        <p:spPr>
+          <a:xfrm>
+            <a:off x="7260336" y="4489704"/>
+            <a:ext cx="1554480" cy="630936"/>
+          </a:xfrm>
+          <a:prstGeom prst="straightConnector1">
+            <a:avLst/>
+          </a:prstGeom>
+          <a:ln>
+            <a:tailEnd type="triangle"/>
+          </a:ln>
+        </p:spPr>
+        <p:style>
+          <a:lnRef idx="1">
+            <a:schemeClr val="accent1"/>
+          </a:lnRef>
+          <a:fillRef idx="0">
+            <a:schemeClr val="accent1"/>
+          </a:fillRef>
+          <a:effectRef idx="0">
+            <a:schemeClr val="accent1"/>
+          </a:effectRef>
+          <a:fontRef idx="minor">
+            <a:schemeClr val="tx1"/>
+          </a:fontRef>
+        </p:style>
+      </p:cxnSp>
+      <p:sp>
+        <p:nvSpPr>
+          <p:cNvPr id="8" name="TextBox 7"/>
+          <p:cNvSpPr txBox="1"/>
+          <p:nvPr/>
+        </p:nvSpPr>
+        <p:spPr>
+          <a:xfrm>
+            <a:off x="5394960" y="4022411"/>
+            <a:ext cx="2075688" cy="646331"/>
+          </a:xfrm>
+          <a:prstGeom prst="rect">
+            <a:avLst/>
+          </a:prstGeom>
+          <a:noFill/>
+        </p:spPr>
+        <p:txBody>
+          <a:bodyPr wrap="square" rtlCol="0">
+            <a:spAutoFit/>
+          </a:bodyPr>
+          <a:lstStyle/>
+          <a:p>
+            <a:r>
+              <a:rPr lang="en-GB" dirty="0"/>
+              <a:t>Object forces character back</a:t>
+            </a:r>
+          </a:p>
+        </p:txBody>
+      </p:sp>
+      <p:sp>
+        <p:nvSpPr>
+          <p:cNvPr id="9" name="TextBox 8"/>
+          <p:cNvSpPr txBox="1"/>
+          <p:nvPr/>
+        </p:nvSpPr>
+        <p:spPr>
+          <a:xfrm>
+            <a:off x="8814816" y="6197934"/>
+            <a:ext cx="1453896" cy="430887"/>
+          </a:xfrm>
+          <a:prstGeom prst="rect">
+            <a:avLst/>
+          </a:prstGeom>
+          <a:noFill/>
+        </p:spPr>
+        <p:txBody>
+          <a:bodyPr wrap="square" rtlCol="0">
+            <a:spAutoFit/>
+          </a:bodyPr>
+          <a:lstStyle/>
+          <a:p>
+            <a:r>
+              <a:rPr lang="en-GB" sz="1100" dirty="0"/>
+              <a:t>Image from: Raft Wars 2</a:t>
+            </a:r>
+          </a:p>
+        </p:txBody>
+      </p:sp>
+    </p:spTree>
+    <p:extLst>
+      <p:ext uri="{BB962C8B-B14F-4D97-AF65-F5344CB8AC3E}">
+        <p14:creationId xmlns:p14="http://schemas.microsoft.com/office/powerpoint/2010/main" val="1382559995"/>
+      </p:ext>
+    </p:extLst>
+  </p:cSld>
+  <p:clrMapOvr>
+    <a:masterClrMapping/>
+  </p:clrMapOvr>
+</p:sld>
+</file>
+
+<file path=ppt/slides/slide8.xml><?xml version="1.0" encoding="utf-8"?>
+<p:sld xmlns:a="http://schemas.openxmlformats.org/drawingml/2006/main" xmlns:r="http://schemas.openxmlformats.org/officeDocument/2006/relationships" xmlns:p="http://schemas.openxmlformats.org/presentationml/2006/main">
+  <p:cSld>
+    <p:spTree>
+      <p:nvGrpSpPr>
+        <p:cNvPr id="1" name=""/>
+        <p:cNvGrpSpPr/>
+        <p:nvPr/>
+      </p:nvGrpSpPr>
+      <p:grpSpPr>
+        <a:xfrm>
+          <a:off x="0" y="0"/>
+          <a:ext cx="0" cy="0"/>
+          <a:chOff x="0" y="0"/>
+          <a:chExt cx="0" cy="0"/>
+        </a:xfrm>
+      </p:grpSpPr>
+      <p:sp>
+        <p:nvSpPr>
+          <p:cNvPr id="2" name="Title 1"/>
+          <p:cNvSpPr>
+            <a:spLocks noGrp="1"/>
+          </p:cNvSpPr>
+          <p:nvPr>
+            <p:ph type="title"/>
+          </p:nvPr>
+        </p:nvSpPr>
+        <p:spPr/>
+        <p:txBody>
+          <a:bodyPr/>
+          <a:lstStyle/>
+          <a:p>
+            <a:r>
+              <a:rPr lang="en-GB" dirty="0"/>
+              <a:t>Third mechanic</a:t>
+            </a:r>
+            <a:br>
+              <a:rPr lang="en-GB" dirty="0"/>
+            </a:br>
+            <a:r>
+              <a:rPr lang="en-GB" dirty="0"/>
+              <a:t>Variants of projectiles</a:t>
+            </a:r>
+          </a:p>
+        </p:txBody>
+      </p:sp>
+      <p:sp>
+        <p:nvSpPr>
+          <p:cNvPr id="3" name="Content Placeholder 2"/>
+          <p:cNvSpPr>
+            <a:spLocks noGrp="1"/>
+          </p:cNvSpPr>
+          <p:nvPr>
+            <p:ph idx="1"/>
+          </p:nvPr>
+        </p:nvSpPr>
+        <p:spPr/>
+        <p:txBody>
+          <a:bodyPr/>
+          <a:lstStyle/>
+          <a:p>
+            <a:r>
+              <a:rPr lang="en-GB" dirty="0"/>
+              <a:t>Some projectiles will have different effects during gameplay</a:t>
+            </a:r>
+          </a:p>
+          <a:p>
+            <a:r>
+              <a:rPr lang="en-GB" dirty="0"/>
+              <a:t>Planned projectiles to be added;</a:t>
+            </a:r>
+          </a:p>
+          <a:p>
+            <a:r>
+              <a:rPr lang="en-GB" dirty="0"/>
+              <a:t>One hit projectiles. (Explodes once it hits any collider, deals massive knockback).</a:t>
+            </a:r>
+          </a:p>
+          <a:p>
+            <a:r>
+              <a:rPr lang="en-GB" dirty="0"/>
+              <a:t>Cluster projectiles. (Can hit multiple targets but deals little knockback)</a:t>
+            </a:r>
+          </a:p>
+          <a:p>
+            <a:endParaRPr lang="en-GB" dirty="0"/>
+          </a:p>
+          <a:p>
+            <a:endParaRPr lang="en-GB" dirty="0"/>
+          </a:p>
+        </p:txBody>
+      </p:sp>
+    </p:spTree>
+    <p:extLst>
+      <p:ext uri="{BB962C8B-B14F-4D97-AF65-F5344CB8AC3E}">
+        <p14:creationId xmlns:p14="http://schemas.microsoft.com/office/powerpoint/2010/main" val="3519669936"/>
+      </p:ext>
+    </p:extLst>
+  </p:cSld>
+  <p:clrMapOvr>
+    <a:masterClrMapping/>
+  </p:clrMapOvr>
+</p:sld>
+</file>
+
+<file path=ppt/slides/slide9.xml><?xml version="1.0" encoding="utf-8"?>
+<p:sld xmlns:a="http://schemas.openxmlformats.org/drawingml/2006/main" xmlns:r="http://schemas.openxmlformats.org/officeDocument/2006/relationships" xmlns:p="http://schemas.openxmlformats.org/presentationml/2006/main">
+  <p:cSld>
+    <p:spTree>
+      <p:nvGrpSpPr>
+        <p:cNvPr id="1" name=""/>
+        <p:cNvGrpSpPr/>
+        <p:nvPr/>
+      </p:nvGrpSpPr>
+      <p:grpSpPr>
+        <a:xfrm>
+          <a:off x="0" y="0"/>
+          <a:ext cx="0" cy="0"/>
+          <a:chOff x="0" y="0"/>
+          <a:chExt cx="0" cy="0"/>
+        </a:xfrm>
+      </p:grpSpPr>
+      <p:sp>
+        <p:nvSpPr>
+          <p:cNvPr id="2" name="Title 1"/>
+          <p:cNvSpPr>
+            <a:spLocks noGrp="1"/>
+          </p:cNvSpPr>
+          <p:nvPr>
+            <p:ph type="title"/>
+          </p:nvPr>
+        </p:nvSpPr>
+        <p:spPr/>
+        <p:txBody>
+          <a:bodyPr/>
+          <a:lstStyle/>
+          <a:p>
+            <a:r>
+              <a:rPr lang="en-GB" dirty="0"/>
+              <a:t>Plans for the future</a:t>
+            </a:r>
+          </a:p>
+        </p:txBody>
+      </p:sp>
+      <p:sp>
+        <p:nvSpPr>
+          <p:cNvPr id="3" name="Content Placeholder 2"/>
+          <p:cNvSpPr>
+            <a:spLocks noGrp="1"/>
+          </p:cNvSpPr>
+          <p:nvPr>
+            <p:ph idx="1"/>
+          </p:nvPr>
+        </p:nvSpPr>
+        <p:spPr/>
+        <p:txBody>
+          <a:bodyPr/>
+          <a:lstStyle/>
+          <a:p>
+            <a:r>
+              <a:rPr lang="en-GB" dirty="0"/>
+              <a:t>Create more working prototypes that use different iterations to each mechanic. (i.e. camera follows projectile, camera can see both players in one screen).</a:t>
+            </a:r>
+          </a:p>
+          <a:p>
+            <a:r>
+              <a:rPr lang="en-GB" dirty="0"/>
+              <a:t>Creating unique sprites ready to be put in game.</a:t>
+            </a:r>
+          </a:p>
+          <a:p>
+            <a:r>
+              <a:rPr lang="en-GB" dirty="0"/>
+              <a:t>Add sound effects</a:t>
+            </a:r>
+          </a:p>
+          <a:p>
+            <a:r>
+              <a:rPr lang="en-GB" dirty="0"/>
+              <a:t>Play testing</a:t>
+            </a:r>
+          </a:p>
+          <a:p>
+            <a:endParaRPr lang="en-GB" dirty="0"/>
+          </a:p>
+          <a:p>
+            <a:endParaRPr lang="en-GB" dirty="0"/>
+          </a:p>
+          <a:p>
+            <a:endParaRPr lang="en-GB" dirty="0"/>
+          </a:p>
+        </p:txBody>
+      </p:sp>
+    </p:spTree>
+    <p:extLst>
+      <p:ext uri="{BB962C8B-B14F-4D97-AF65-F5344CB8AC3E}">
+        <p14:creationId xmlns:p14="http://schemas.microsoft.com/office/powerpoint/2010/main" val="1605740186"/>
       </p:ext>
     </p:extLst>
   </p:cSld>

</xml_diff>